<commit_message>
Updating (ch15 extended editions slides) 	modified:   week05-ch15-21plus-pys.pptx
</commit_message>
<xml_diff>
--- a/week05-ch15-21plus-pys.pptx
+++ b/week05-ch15-21plus-pys.pptx
@@ -39,8 +39,8 @@
     <p:sldId id="313" r:id="rId33"/>
     <p:sldId id="329" r:id="rId34"/>
     <p:sldId id="328" r:id="rId35"/>
-    <p:sldId id="330" r:id="rId36"/>
-    <p:sldId id="326" r:id="rId37"/>
+    <p:sldId id="326" r:id="rId36"/>
+    <p:sldId id="330" r:id="rId37"/>
     <p:sldId id="331" r:id="rId38"/>
     <p:sldId id="306" r:id="rId39"/>
   </p:sldIdLst>
@@ -204,8 +204,8 @@
           <p14:sldIdLst>
             <p14:sldId id="329"/>
             <p14:sldId id="328"/>
+            <p14:sldId id="326"/>
             <p14:sldId id="330"/>
-            <p14:sldId id="326"/>
           </p14:sldIdLst>
         </p14:section>
         <p14:section name="Chapter 16" id="{7A6BEDBC-DE7D-BE41-9346-DAF38EE2AF1E}">
@@ -5746,73 +5746,85 @@
               <a:t>A programmer-defined type is also called a </a:t>
             </a:r>
             <a:r>
+              <a:rPr lang="en-US" b="1" dirty="0">
+                <a:solidFill>
+                  <a:srgbClr val="FF0000"/>
+                </a:solidFill>
+              </a:rPr>
+              <a:t>class</a:t>
+            </a:r>
+            <a:r>
+              <a:rPr lang="en-US" dirty="0"/>
+              <a:t>. A class definition looks like this: </a:t>
+            </a:r>
+            <a:endParaRPr lang="en-US" dirty="0"/>
+          </a:p>
+          <a:p>
+            <a:pPr marL="457200" lvl="1" indent="0">
+              <a:buNone/>
+            </a:pPr>
+            <a:r>
+              <a:rPr lang="en-US" sz="1400" dirty="0" smtClean="0">
+                <a:latin typeface="Times New Roman" charset="0"/>
+                <a:ea typeface="Times New Roman" charset="0"/>
+                <a:cs typeface="Times New Roman" charset="0"/>
+              </a:rPr>
+              <a:t>class Point:</a:t>
+            </a:r>
+          </a:p>
+          <a:p>
+            <a:pPr marL="457200" lvl="1" indent="0">
+              <a:buNone/>
+            </a:pPr>
+            <a:r>
+              <a:rPr lang="en-US" sz="1400" dirty="0">
+                <a:latin typeface="Times New Roman" charset="0"/>
+                <a:ea typeface="Times New Roman" charset="0"/>
+                <a:cs typeface="Times New Roman" charset="0"/>
+              </a:rPr>
+              <a:t> </a:t>
+            </a:r>
+            <a:r>
+              <a:rPr lang="en-US" sz="1400" dirty="0" smtClean="0">
+                <a:latin typeface="Times New Roman" charset="0"/>
+                <a:ea typeface="Times New Roman" charset="0"/>
+                <a:cs typeface="Times New Roman" charset="0"/>
+              </a:rPr>
+              <a:t>   """</a:t>
+            </a:r>
+            <a:r>
+              <a:rPr lang="en-US" sz="1400" dirty="0">
+                <a:latin typeface="Times New Roman" charset="0"/>
+                <a:ea typeface="Times New Roman" charset="0"/>
+                <a:cs typeface="Times New Roman" charset="0"/>
+              </a:rPr>
+              <a:t>Represents a point in 2-D space.""" </a:t>
+            </a:r>
+          </a:p>
+          <a:p>
+            <a:r>
+              <a:rPr lang="en-US" dirty="0"/>
+              <a:t>Defining a class named </a:t>
+            </a:r>
+            <a:r>
+              <a:rPr lang="en-US" dirty="0"/>
+              <a:t>Point </a:t>
+            </a:r>
+            <a:r>
+              <a:rPr lang="en-US" dirty="0"/>
+              <a:t>creates a </a:t>
+            </a:r>
+            <a:r>
               <a:rPr lang="en-US" b="1" dirty="0"/>
-              <a:t>class</a:t>
-            </a:r>
-            <a:r>
-              <a:rPr lang="en-US" dirty="0"/>
-              <a:t>. A class definition looks like this: </a:t>
-            </a:r>
-            <a:endParaRPr lang="en-US" dirty="0"/>
-          </a:p>
-          <a:p>
-            <a:pPr marL="457200" lvl="1" indent="0">
-              <a:buNone/>
-            </a:pPr>
-            <a:r>
-              <a:rPr lang="en-US" sz="1400" dirty="0" smtClean="0">
-                <a:latin typeface="Times New Roman" charset="0"/>
-                <a:ea typeface="Times New Roman" charset="0"/>
-                <a:cs typeface="Times New Roman" charset="0"/>
-              </a:rPr>
-              <a:t>class Point:</a:t>
-            </a:r>
-          </a:p>
-          <a:p>
-            <a:pPr marL="457200" lvl="1" indent="0">
-              <a:buNone/>
-            </a:pPr>
-            <a:r>
-              <a:rPr lang="en-US" sz="1400" dirty="0">
-                <a:latin typeface="Times New Roman" charset="0"/>
-                <a:ea typeface="Times New Roman" charset="0"/>
-                <a:cs typeface="Times New Roman" charset="0"/>
-              </a:rPr>
-              <a:t> </a:t>
-            </a:r>
-            <a:r>
-              <a:rPr lang="en-US" sz="1400" dirty="0" smtClean="0">
-                <a:latin typeface="Times New Roman" charset="0"/>
-                <a:ea typeface="Times New Roman" charset="0"/>
-                <a:cs typeface="Times New Roman" charset="0"/>
-              </a:rPr>
-              <a:t>   """</a:t>
-            </a:r>
-            <a:r>
-              <a:rPr lang="en-US" sz="1400" dirty="0">
-                <a:latin typeface="Times New Roman" charset="0"/>
-                <a:ea typeface="Times New Roman" charset="0"/>
-                <a:cs typeface="Times New Roman" charset="0"/>
-              </a:rPr>
-              <a:t>Represents a point in 2-D space.""" </a:t>
-            </a:r>
-          </a:p>
-          <a:p>
-            <a:r>
-              <a:rPr lang="en-US" dirty="0"/>
-              <a:t>Defining a class named </a:t>
-            </a:r>
-            <a:r>
-              <a:rPr lang="en-US" dirty="0"/>
-              <a:t>Point </a:t>
-            </a:r>
-            <a:r>
-              <a:rPr lang="en-US" dirty="0"/>
-              <a:t>creates a </a:t>
-            </a:r>
-            <a:r>
-              <a:rPr lang="en-US" b="1" dirty="0"/>
-              <a:t>class object</a:t>
+              <a:t>class </a:t>
+            </a:r>
+            <a:r>
+              <a:rPr lang="en-US" b="1" dirty="0">
+                <a:solidFill>
+                  <a:srgbClr val="FF0000"/>
+                </a:solidFill>
+              </a:rPr>
+              <a:t>object</a:t>
             </a:r>
             <a:r>
               <a:rPr lang="en-US" dirty="0"/>
@@ -6240,10 +6252,18 @@
           <a:lstStyle/>
           <a:p>
             <a:r>
-              <a:rPr lang="en-US" dirty="0" smtClean="0"/>
-              <a:t>Attributes</a:t>
-            </a:r>
-            <a:endParaRPr lang="en-US" dirty="0"/>
+              <a:rPr lang="en-US" dirty="0" smtClean="0">
+                <a:solidFill>
+                  <a:srgbClr val="FF0000"/>
+                </a:solidFill>
+              </a:rPr>
+              <a:t>Attribute</a:t>
+            </a:r>
+            <a:endParaRPr lang="en-US" dirty="0">
+              <a:solidFill>
+                <a:srgbClr val="FF0000"/>
+              </a:solidFill>
+            </a:endParaRPr>
           </a:p>
         </p:txBody>
       </p:sp>
@@ -10064,7 +10084,7 @@
           <a:p>
             <a:r>
               <a:rPr lang="en-US" dirty="0" smtClean="0"/>
-              <a:t>Shallow Copy Issues and Examples (ch15)</a:t>
+              <a:t>Shallow Copy usage and Examples (ch15)</a:t>
             </a:r>
             <a:endParaRPr lang="en-US" dirty="0"/>
           </a:p>
@@ -10085,7 +10105,18 @@
           <a:bodyPr/>
           <a:lstStyle/>
           <a:p>
-            <a:endParaRPr lang="en-US"/>
+            <a:r>
+              <a:rPr lang="en-US" dirty="0" smtClean="0"/>
+              <a:t>Explain shallow vs deep copy</a:t>
+            </a:r>
+          </a:p>
+          <a:p>
+            <a:pPr lvl="1"/>
+            <a:r>
+              <a:rPr lang="en-US" dirty="0" smtClean="0"/>
+              <a:t>Why one or the other?</a:t>
+            </a:r>
+            <a:endParaRPr lang="en-US" dirty="0"/>
           </a:p>
         </p:txBody>
       </p:sp>
@@ -10136,256 +10167,46 @@
           <a:p>
             <a:r>
               <a:rPr lang="en-US" dirty="0" smtClean="0"/>
-              <a:t>Copy an object and its attributes (</a:t>
-            </a:r>
-            <a:r>
-              <a:rPr lang="en-US" b="1" dirty="0" smtClean="0"/>
-              <a:t>deep copy</a:t>
-            </a:r>
-            <a:r>
-              <a:rPr lang="en-US" dirty="0" smtClean="0"/>
-              <a:t>)</a:t>
-            </a:r>
-            <a:endParaRPr lang="en-US" dirty="0"/>
-          </a:p>
-        </p:txBody>
-      </p:sp>
-      <p:sp>
-        <p:nvSpPr>
-          <p:cNvPr id="3" name="Content Placeholder 2"/>
-          <p:cNvSpPr>
-            <a:spLocks noGrp="1"/>
-          </p:cNvSpPr>
+              <a:t>object state diagram </a:t>
+            </a:r>
+            <a:r>
+              <a:rPr lang="en-US" i="1" dirty="0" smtClean="0"/>
+              <a:t>(shallow copy)</a:t>
+            </a:r>
+            <a:endParaRPr lang="en-US" i="1" dirty="0"/>
+          </a:p>
+        </p:txBody>
+      </p:sp>
+      <p:pic>
+        <p:nvPicPr>
+          <p:cNvPr id="4" name="Content Placeholder 3"/>
+          <p:cNvPicPr>
+            <a:picLocks noGrp="1" noChangeAspect="1"/>
+          </p:cNvPicPr>
           <p:nvPr>
             <p:ph idx="1"/>
           </p:nvPr>
-        </p:nvSpPr>
-        <p:spPr/>
-        <p:txBody>
-          <a:bodyPr>
-            <a:normAutofit fontScale="92500" lnSpcReduction="10000"/>
-          </a:bodyPr>
-          <a:lstStyle/>
-          <a:p>
-            <a:r>
-              <a:rPr lang="en-US" dirty="0"/>
-              <a:t>Fortunately, the </a:t>
-            </a:r>
-            <a:r>
-              <a:rPr lang="en-US" dirty="0"/>
-              <a:t>copy </a:t>
-            </a:r>
-            <a:r>
-              <a:rPr lang="en-US" dirty="0"/>
-              <a:t>module provides a method named </a:t>
-            </a:r>
-            <a:r>
-              <a:rPr lang="en-US" b="1" dirty="0" err="1"/>
-              <a:t>deepcopy</a:t>
-            </a:r>
-            <a:r>
-              <a:rPr lang="en-US" dirty="0"/>
-              <a:t> </a:t>
-            </a:r>
-            <a:r>
-              <a:rPr lang="en-US" dirty="0"/>
-              <a:t>that copies not only the object but also the objects it refers to, and the objects </a:t>
-            </a:r>
-            <a:r>
-              <a:rPr lang="en-US" i="1" dirty="0"/>
-              <a:t>they </a:t>
-            </a:r>
-            <a:r>
-              <a:rPr lang="en-US" dirty="0"/>
-              <a:t>refer to, and so on. You will not be surprised to learn that this operation is called a </a:t>
-            </a:r>
-            <a:r>
-              <a:rPr lang="en-US" b="1" dirty="0"/>
-              <a:t>deep copy</a:t>
-            </a:r>
-            <a:r>
-              <a:rPr lang="en-US" dirty="0"/>
-              <a:t>. </a:t>
-            </a:r>
-            <a:endParaRPr lang="en-US" dirty="0"/>
-          </a:p>
-          <a:p>
-            <a:pPr marL="457200" lvl="1" indent="0">
-              <a:buNone/>
-            </a:pPr>
-            <a:r>
-              <a:rPr lang="en-US" dirty="0">
-                <a:latin typeface="Times New Roman" charset="0"/>
-                <a:ea typeface="Times New Roman" charset="0"/>
-                <a:cs typeface="Times New Roman" charset="0"/>
-              </a:rPr>
-              <a:t>&gt;&gt;&gt; box3 = </a:t>
-            </a:r>
-            <a:r>
-              <a:rPr lang="en-US" dirty="0" err="1">
-                <a:latin typeface="Times New Roman" charset="0"/>
-                <a:ea typeface="Times New Roman" charset="0"/>
-                <a:cs typeface="Times New Roman" charset="0"/>
-              </a:rPr>
-              <a:t>copy.deepcopy</a:t>
-            </a:r>
-            <a:r>
-              <a:rPr lang="en-US" dirty="0">
-                <a:latin typeface="Times New Roman" charset="0"/>
-                <a:ea typeface="Times New Roman" charset="0"/>
-                <a:cs typeface="Times New Roman" charset="0"/>
-              </a:rPr>
-              <a:t>(box) </a:t>
-            </a:r>
-            <a:endParaRPr lang="en-US" dirty="0" smtClean="0">
-              <a:latin typeface="Times New Roman" charset="0"/>
-              <a:ea typeface="Times New Roman" charset="0"/>
-              <a:cs typeface="Times New Roman" charset="0"/>
-            </a:endParaRPr>
-          </a:p>
-          <a:p>
-            <a:pPr marL="457200" lvl="1" indent="0">
-              <a:buNone/>
-            </a:pPr>
-            <a:r>
-              <a:rPr lang="en-US" dirty="0" smtClean="0">
-                <a:latin typeface="Times New Roman" charset="0"/>
-                <a:ea typeface="Times New Roman" charset="0"/>
-                <a:cs typeface="Times New Roman" charset="0"/>
-              </a:rPr>
-              <a:t>&gt;&gt;&gt; </a:t>
-            </a:r>
-            <a:r>
-              <a:rPr lang="en-US" dirty="0">
-                <a:latin typeface="Times New Roman" charset="0"/>
-                <a:ea typeface="Times New Roman" charset="0"/>
-                <a:cs typeface="Times New Roman" charset="0"/>
-              </a:rPr>
-              <a:t>box3 is box </a:t>
-            </a:r>
-            <a:endParaRPr lang="en-US" dirty="0" smtClean="0">
-              <a:latin typeface="Times New Roman" charset="0"/>
-              <a:ea typeface="Times New Roman" charset="0"/>
-              <a:cs typeface="Times New Roman" charset="0"/>
-            </a:endParaRPr>
-          </a:p>
-          <a:p>
-            <a:pPr marL="457200" lvl="1" indent="0">
-              <a:buNone/>
-            </a:pPr>
-            <a:r>
-              <a:rPr lang="en-US" dirty="0" smtClean="0">
-                <a:latin typeface="Times New Roman" charset="0"/>
-                <a:ea typeface="Times New Roman" charset="0"/>
-                <a:cs typeface="Times New Roman" charset="0"/>
-              </a:rPr>
-              <a:t>False </a:t>
-            </a:r>
-          </a:p>
-          <a:p>
-            <a:pPr marL="457200" lvl="1" indent="0">
-              <a:buNone/>
-            </a:pPr>
-            <a:r>
-              <a:rPr lang="en-US" dirty="0" smtClean="0">
-                <a:latin typeface="Times New Roman" charset="0"/>
-                <a:ea typeface="Times New Roman" charset="0"/>
-                <a:cs typeface="Times New Roman" charset="0"/>
-              </a:rPr>
-              <a:t>&gt;&gt;&gt; </a:t>
-            </a:r>
-            <a:r>
-              <a:rPr lang="en-US" dirty="0">
-                <a:latin typeface="Times New Roman" charset="0"/>
-                <a:ea typeface="Times New Roman" charset="0"/>
-                <a:cs typeface="Times New Roman" charset="0"/>
-              </a:rPr>
-              <a:t>box3.corner </a:t>
-            </a:r>
-            <a:endParaRPr lang="en-US" dirty="0" smtClean="0">
-              <a:latin typeface="Times New Roman" charset="0"/>
-              <a:ea typeface="Times New Roman" charset="0"/>
-              <a:cs typeface="Times New Roman" charset="0"/>
-            </a:endParaRPr>
-          </a:p>
-          <a:p>
-            <a:pPr marL="457200" lvl="1" indent="0">
-              <a:buNone/>
-            </a:pPr>
-            <a:r>
-              <a:rPr lang="en-US" dirty="0" smtClean="0">
-                <a:latin typeface="Times New Roman" charset="0"/>
-                <a:ea typeface="Times New Roman" charset="0"/>
-                <a:cs typeface="Times New Roman" charset="0"/>
-              </a:rPr>
-              <a:t>is </a:t>
-            </a:r>
-            <a:r>
-              <a:rPr lang="en-US" dirty="0" err="1">
-                <a:latin typeface="Times New Roman" charset="0"/>
-                <a:ea typeface="Times New Roman" charset="0"/>
-                <a:cs typeface="Times New Roman" charset="0"/>
-              </a:rPr>
-              <a:t>box.corner</a:t>
-            </a:r>
-            <a:r>
-              <a:rPr lang="en-US" dirty="0">
-                <a:latin typeface="Times New Roman" charset="0"/>
-                <a:ea typeface="Times New Roman" charset="0"/>
-                <a:cs typeface="Times New Roman" charset="0"/>
-              </a:rPr>
-              <a:t> </a:t>
-            </a:r>
-            <a:endParaRPr lang="en-US" dirty="0" smtClean="0">
-              <a:latin typeface="Times New Roman" charset="0"/>
-              <a:ea typeface="Times New Roman" charset="0"/>
-              <a:cs typeface="Times New Roman" charset="0"/>
-            </a:endParaRPr>
-          </a:p>
-          <a:p>
-            <a:pPr marL="457200" lvl="1" indent="0">
-              <a:buNone/>
-            </a:pPr>
-            <a:r>
-              <a:rPr lang="en-US" dirty="0" smtClean="0">
-                <a:latin typeface="Times New Roman" charset="0"/>
-                <a:ea typeface="Times New Roman" charset="0"/>
-                <a:cs typeface="Times New Roman" charset="0"/>
-              </a:rPr>
-              <a:t>False </a:t>
-            </a:r>
-          </a:p>
-          <a:p>
-            <a:r>
-              <a:rPr lang="en-US" dirty="0" smtClean="0"/>
-              <a:t>box3 </a:t>
-            </a:r>
-            <a:r>
-              <a:rPr lang="en-US" dirty="0"/>
-              <a:t>and </a:t>
-            </a:r>
-            <a:r>
-              <a:rPr lang="en-US" dirty="0"/>
-              <a:t>box </a:t>
-            </a:r>
-            <a:r>
-              <a:rPr lang="en-US" dirty="0"/>
-              <a:t>are completely separate objects.</a:t>
-            </a:r>
-            <a:br>
-              <a:rPr lang="en-US" dirty="0"/>
-            </a:br>
-            <a:endParaRPr lang="en-US" dirty="0"/>
-          </a:p>
-          <a:p>
-            <a:endParaRPr lang="en-US" dirty="0"/>
-          </a:p>
-        </p:txBody>
-      </p:sp>
+        </p:nvPicPr>
+        <p:blipFill>
+          <a:blip r:embed="rId2"/>
+          <a:stretch>
+            <a:fillRect/>
+          </a:stretch>
+        </p:blipFill>
+        <p:spPr>
+          <a:xfrm>
+            <a:off x="838200" y="2779565"/>
+            <a:ext cx="10515600" cy="2443458"/>
+          </a:xfrm>
+          <a:prstGeom prst="rect">
+            <a:avLst/>
+          </a:prstGeom>
+        </p:spPr>
+      </p:pic>
     </p:spTree>
     <p:extLst>
       <p:ext uri="{BB962C8B-B14F-4D97-AF65-F5344CB8AC3E}">
-        <p14:creationId xmlns:p14="http://schemas.microsoft.com/office/powerpoint/2010/main" val="1198603686"/>
+        <p14:creationId xmlns:p14="http://schemas.microsoft.com/office/powerpoint/2010/main" val="1127778411"/>
       </p:ext>
     </p:extLst>
   </p:cSld>
@@ -10429,46 +10250,256 @@
           <a:p>
             <a:r>
               <a:rPr lang="en-US" dirty="0" smtClean="0"/>
-              <a:t>object state diagram </a:t>
-            </a:r>
-            <a:r>
-              <a:rPr lang="en-US" i="1" dirty="0" smtClean="0"/>
-              <a:t>(shallow copy)</a:t>
-            </a:r>
-            <a:endParaRPr lang="en-US" i="1" dirty="0"/>
-          </a:p>
-        </p:txBody>
-      </p:sp>
-      <p:pic>
-        <p:nvPicPr>
-          <p:cNvPr id="4" name="Content Placeholder 3"/>
-          <p:cNvPicPr>
-            <a:picLocks noGrp="1" noChangeAspect="1"/>
-          </p:cNvPicPr>
+              <a:t>Copy an object and its attributes (</a:t>
+            </a:r>
+            <a:r>
+              <a:rPr lang="en-US" b="1" dirty="0" smtClean="0"/>
+              <a:t>deep copy</a:t>
+            </a:r>
+            <a:r>
+              <a:rPr lang="en-US" dirty="0" smtClean="0"/>
+              <a:t>)</a:t>
+            </a:r>
+            <a:endParaRPr lang="en-US" dirty="0"/>
+          </a:p>
+        </p:txBody>
+      </p:sp>
+      <p:sp>
+        <p:nvSpPr>
+          <p:cNvPr id="3" name="Content Placeholder 2"/>
+          <p:cNvSpPr>
+            <a:spLocks noGrp="1"/>
+          </p:cNvSpPr>
           <p:nvPr>
             <p:ph idx="1"/>
           </p:nvPr>
-        </p:nvPicPr>
-        <p:blipFill>
-          <a:blip r:embed="rId2"/>
-          <a:stretch>
-            <a:fillRect/>
-          </a:stretch>
-        </p:blipFill>
-        <p:spPr>
-          <a:xfrm>
-            <a:off x="838200" y="2779565"/>
-            <a:ext cx="10515600" cy="2443458"/>
-          </a:xfrm>
-          <a:prstGeom prst="rect">
-            <a:avLst/>
-          </a:prstGeom>
-        </p:spPr>
-      </p:pic>
+        </p:nvSpPr>
+        <p:spPr/>
+        <p:txBody>
+          <a:bodyPr>
+            <a:normAutofit fontScale="92500" lnSpcReduction="10000"/>
+          </a:bodyPr>
+          <a:lstStyle/>
+          <a:p>
+            <a:r>
+              <a:rPr lang="en-US" dirty="0"/>
+              <a:t>Fortunately, the </a:t>
+            </a:r>
+            <a:r>
+              <a:rPr lang="en-US" dirty="0"/>
+              <a:t>copy </a:t>
+            </a:r>
+            <a:r>
+              <a:rPr lang="en-US" dirty="0"/>
+              <a:t>module provides a method named </a:t>
+            </a:r>
+            <a:r>
+              <a:rPr lang="en-US" b="1" dirty="0" err="1"/>
+              <a:t>deepcopy</a:t>
+            </a:r>
+            <a:r>
+              <a:rPr lang="en-US" dirty="0"/>
+              <a:t> </a:t>
+            </a:r>
+            <a:r>
+              <a:rPr lang="en-US" dirty="0"/>
+              <a:t>that copies not only the object but also the objects it refers to, and the objects </a:t>
+            </a:r>
+            <a:r>
+              <a:rPr lang="en-US" i="1" dirty="0"/>
+              <a:t>they </a:t>
+            </a:r>
+            <a:r>
+              <a:rPr lang="en-US" dirty="0"/>
+              <a:t>refer to, and so on. You will not be surprised to learn that this operation is called a </a:t>
+            </a:r>
+            <a:r>
+              <a:rPr lang="en-US" b="1" dirty="0"/>
+              <a:t>deep copy</a:t>
+            </a:r>
+            <a:r>
+              <a:rPr lang="en-US" dirty="0"/>
+              <a:t>. </a:t>
+            </a:r>
+            <a:endParaRPr lang="en-US" dirty="0"/>
+          </a:p>
+          <a:p>
+            <a:pPr marL="457200" lvl="1" indent="0">
+              <a:buNone/>
+            </a:pPr>
+            <a:r>
+              <a:rPr lang="en-US" dirty="0">
+                <a:latin typeface="Times New Roman" charset="0"/>
+                <a:ea typeface="Times New Roman" charset="0"/>
+                <a:cs typeface="Times New Roman" charset="0"/>
+              </a:rPr>
+              <a:t>&gt;&gt;&gt; box3 = </a:t>
+            </a:r>
+            <a:r>
+              <a:rPr lang="en-US" dirty="0" err="1">
+                <a:latin typeface="Times New Roman" charset="0"/>
+                <a:ea typeface="Times New Roman" charset="0"/>
+                <a:cs typeface="Times New Roman" charset="0"/>
+              </a:rPr>
+              <a:t>copy.deepcopy</a:t>
+            </a:r>
+            <a:r>
+              <a:rPr lang="en-US" dirty="0">
+                <a:latin typeface="Times New Roman" charset="0"/>
+                <a:ea typeface="Times New Roman" charset="0"/>
+                <a:cs typeface="Times New Roman" charset="0"/>
+              </a:rPr>
+              <a:t>(box) </a:t>
+            </a:r>
+            <a:endParaRPr lang="en-US" dirty="0" smtClean="0">
+              <a:latin typeface="Times New Roman" charset="0"/>
+              <a:ea typeface="Times New Roman" charset="0"/>
+              <a:cs typeface="Times New Roman" charset="0"/>
+            </a:endParaRPr>
+          </a:p>
+          <a:p>
+            <a:pPr marL="457200" lvl="1" indent="0">
+              <a:buNone/>
+            </a:pPr>
+            <a:r>
+              <a:rPr lang="en-US" dirty="0" smtClean="0">
+                <a:latin typeface="Times New Roman" charset="0"/>
+                <a:ea typeface="Times New Roman" charset="0"/>
+                <a:cs typeface="Times New Roman" charset="0"/>
+              </a:rPr>
+              <a:t>&gt;&gt;&gt; </a:t>
+            </a:r>
+            <a:r>
+              <a:rPr lang="en-US" dirty="0">
+                <a:latin typeface="Times New Roman" charset="0"/>
+                <a:ea typeface="Times New Roman" charset="0"/>
+                <a:cs typeface="Times New Roman" charset="0"/>
+              </a:rPr>
+              <a:t>box3 is box </a:t>
+            </a:r>
+            <a:endParaRPr lang="en-US" dirty="0" smtClean="0">
+              <a:latin typeface="Times New Roman" charset="0"/>
+              <a:ea typeface="Times New Roman" charset="0"/>
+              <a:cs typeface="Times New Roman" charset="0"/>
+            </a:endParaRPr>
+          </a:p>
+          <a:p>
+            <a:pPr marL="457200" lvl="1" indent="0">
+              <a:buNone/>
+            </a:pPr>
+            <a:r>
+              <a:rPr lang="en-US" dirty="0" smtClean="0">
+                <a:latin typeface="Times New Roman" charset="0"/>
+                <a:ea typeface="Times New Roman" charset="0"/>
+                <a:cs typeface="Times New Roman" charset="0"/>
+              </a:rPr>
+              <a:t>False </a:t>
+            </a:r>
+          </a:p>
+          <a:p>
+            <a:pPr marL="457200" lvl="1" indent="0">
+              <a:buNone/>
+            </a:pPr>
+            <a:r>
+              <a:rPr lang="en-US" dirty="0" smtClean="0">
+                <a:latin typeface="Times New Roman" charset="0"/>
+                <a:ea typeface="Times New Roman" charset="0"/>
+                <a:cs typeface="Times New Roman" charset="0"/>
+              </a:rPr>
+              <a:t>&gt;&gt;&gt; </a:t>
+            </a:r>
+            <a:r>
+              <a:rPr lang="en-US" dirty="0">
+                <a:latin typeface="Times New Roman" charset="0"/>
+                <a:ea typeface="Times New Roman" charset="0"/>
+                <a:cs typeface="Times New Roman" charset="0"/>
+              </a:rPr>
+              <a:t>box3.corner </a:t>
+            </a:r>
+            <a:endParaRPr lang="en-US" dirty="0" smtClean="0">
+              <a:latin typeface="Times New Roman" charset="0"/>
+              <a:ea typeface="Times New Roman" charset="0"/>
+              <a:cs typeface="Times New Roman" charset="0"/>
+            </a:endParaRPr>
+          </a:p>
+          <a:p>
+            <a:pPr marL="457200" lvl="1" indent="0">
+              <a:buNone/>
+            </a:pPr>
+            <a:r>
+              <a:rPr lang="en-US" dirty="0" smtClean="0">
+                <a:latin typeface="Times New Roman" charset="0"/>
+                <a:ea typeface="Times New Roman" charset="0"/>
+                <a:cs typeface="Times New Roman" charset="0"/>
+              </a:rPr>
+              <a:t>is </a:t>
+            </a:r>
+            <a:r>
+              <a:rPr lang="en-US" dirty="0" err="1">
+                <a:latin typeface="Times New Roman" charset="0"/>
+                <a:ea typeface="Times New Roman" charset="0"/>
+                <a:cs typeface="Times New Roman" charset="0"/>
+              </a:rPr>
+              <a:t>box.corner</a:t>
+            </a:r>
+            <a:r>
+              <a:rPr lang="en-US" dirty="0">
+                <a:latin typeface="Times New Roman" charset="0"/>
+                <a:ea typeface="Times New Roman" charset="0"/>
+                <a:cs typeface="Times New Roman" charset="0"/>
+              </a:rPr>
+              <a:t> </a:t>
+            </a:r>
+            <a:endParaRPr lang="en-US" dirty="0" smtClean="0">
+              <a:latin typeface="Times New Roman" charset="0"/>
+              <a:ea typeface="Times New Roman" charset="0"/>
+              <a:cs typeface="Times New Roman" charset="0"/>
+            </a:endParaRPr>
+          </a:p>
+          <a:p>
+            <a:pPr marL="457200" lvl="1" indent="0">
+              <a:buNone/>
+            </a:pPr>
+            <a:r>
+              <a:rPr lang="en-US" dirty="0" smtClean="0">
+                <a:latin typeface="Times New Roman" charset="0"/>
+                <a:ea typeface="Times New Roman" charset="0"/>
+                <a:cs typeface="Times New Roman" charset="0"/>
+              </a:rPr>
+              <a:t>False </a:t>
+            </a:r>
+          </a:p>
+          <a:p>
+            <a:r>
+              <a:rPr lang="en-US" dirty="0" smtClean="0"/>
+              <a:t>box3 </a:t>
+            </a:r>
+            <a:r>
+              <a:rPr lang="en-US" dirty="0"/>
+              <a:t>and </a:t>
+            </a:r>
+            <a:r>
+              <a:rPr lang="en-US" dirty="0"/>
+              <a:t>box </a:t>
+            </a:r>
+            <a:r>
+              <a:rPr lang="en-US" dirty="0"/>
+              <a:t>are completely separate objects.</a:t>
+            </a:r>
+            <a:br>
+              <a:rPr lang="en-US" dirty="0"/>
+            </a:br>
+            <a:endParaRPr lang="en-US" dirty="0"/>
+          </a:p>
+          <a:p>
+            <a:endParaRPr lang="en-US" dirty="0"/>
+          </a:p>
+        </p:txBody>
+      </p:sp>
     </p:spTree>
     <p:extLst>
       <p:ext uri="{BB962C8B-B14F-4D97-AF65-F5344CB8AC3E}">
-        <p14:creationId xmlns:p14="http://schemas.microsoft.com/office/powerpoint/2010/main" val="1127778411"/>
+        <p14:creationId xmlns:p14="http://schemas.microsoft.com/office/powerpoint/2010/main" val="1198603686"/>
       </p:ext>
     </p:extLst>
   </p:cSld>

</xml_diff>

<commit_message>
Typo / formatting correction for Ch15 code on slide. 	modified:   week05-ch15-21plus-pys.pptx
</commit_message>
<xml_diff>
--- a/week05-ch15-21plus-pys.pptx
+++ b/week05-ch15-21plus-pys.pptx
@@ -3862,6 +3862,13 @@
   <p:clrMapOvr>
     <a:masterClrMapping/>
   </p:clrMapOvr>
+  <p:timing>
+    <p:tnLst>
+      <p:par>
+        <p:cTn id="1" dur="indefinite" restart="never" nodeType="tmRoot"/>
+      </p:par>
+    </p:tnLst>
+  </p:timing>
 </p:sld>
 </file>
 
@@ -4746,6 +4753,13 @@
   <p:clrMapOvr>
     <a:masterClrMapping/>
   </p:clrMapOvr>
+  <p:timing>
+    <p:tnLst>
+      <p:par>
+        <p:cTn id="1" dur="indefinite" restart="never" nodeType="tmRoot"/>
+      </p:par>
+    </p:tnLst>
+  </p:timing>
 </p:sld>
 </file>
 
@@ -5337,6 +5351,13 @@
   <p:clrMapOvr>
     <a:masterClrMapping/>
   </p:clrMapOvr>
+  <p:timing>
+    <p:tnLst>
+      <p:par>
+        <p:cTn id="1" dur="indefinite" restart="never" nodeType="tmRoot"/>
+      </p:par>
+    </p:tnLst>
+  </p:timing>
 </p:sld>
 </file>
 
@@ -5510,6 +5531,13 @@
   <p:clrMapOvr>
     <a:masterClrMapping/>
   </p:clrMapOvr>
+  <p:timing>
+    <p:tnLst>
+      <p:par>
+        <p:cTn id="1" dur="indefinite" restart="never" nodeType="tmRoot"/>
+      </p:par>
+    </p:tnLst>
+  </p:timing>
 </p:sld>
 </file>
 
@@ -5588,6 +5616,13 @@
   <p:clrMapOvr>
     <a:masterClrMapping/>
   </p:clrMapOvr>
+  <p:timing>
+    <p:tnLst>
+      <p:par>
+        <p:cTn id="1" dur="indefinite" restart="never" nodeType="tmRoot"/>
+      </p:par>
+    </p:tnLst>
+  </p:timing>
 </p:sld>
 </file>
 
@@ -5677,6 +5712,13 @@
   <p:clrMapOvr>
     <a:masterClrMapping/>
   </p:clrMapOvr>
+  <p:timing>
+    <p:tnLst>
+      <p:par>
+        <p:cTn id="1" dur="indefinite" restart="never" nodeType="tmRoot"/>
+      </p:par>
+    </p:tnLst>
+  </p:timing>
 </p:sld>
 </file>
 
@@ -5815,22 +5857,60 @@
               <a:t>creates a </a:t>
             </a:r>
             <a:r>
-              <a:rPr lang="en-US" b="1" dirty="0"/>
-              <a:t>class </a:t>
-            </a:r>
-            <a:r>
               <a:rPr lang="en-US" b="1" dirty="0">
                 <a:solidFill>
                   <a:srgbClr val="FF0000"/>
                 </a:solidFill>
               </a:rPr>
+              <a:t>class</a:t>
+            </a:r>
+            <a:r>
+              <a:rPr lang="en-US" b="1" dirty="0"/>
+              <a:t> </a:t>
+            </a:r>
+            <a:r>
+              <a:rPr lang="en-US" b="1" dirty="0">
+                <a:solidFill>
+                  <a:srgbClr val="FF0000"/>
+                </a:solidFill>
+              </a:rPr>
               <a:t>object</a:t>
             </a:r>
             <a:r>
               <a:rPr lang="en-US" dirty="0"/>
               <a:t>. </a:t>
             </a:r>
-            <a:endParaRPr lang="en-US" dirty="0" smtClean="0"/>
+            <a:r>
+              <a:rPr lang="en-US" dirty="0"/>
+              <a:t/>
+            </a:r>
+            <a:br>
+              <a:rPr lang="en-US" dirty="0"/>
+            </a:br>
+            <a:r>
+              <a:rPr lang="en-US" dirty="0" smtClean="0"/>
+              <a:t>(often </a:t>
+            </a:r>
+            <a:r>
+              <a:rPr lang="en-US" dirty="0" err="1" smtClean="0"/>
+              <a:t>refferred</a:t>
+            </a:r>
+            <a:r>
+              <a:rPr lang="en-US" dirty="0" smtClean="0"/>
+              <a:t> to as an </a:t>
+            </a:r>
+            <a:r>
+              <a:rPr lang="en-US" b="1" dirty="0" smtClean="0">
+                <a:solidFill>
+                  <a:srgbClr val="FF0000"/>
+                </a:solidFill>
+              </a:rPr>
+              <a:t>object</a:t>
+            </a:r>
+            <a:r>
+              <a:rPr lang="en-US" dirty="0" smtClean="0"/>
+              <a:t>)</a:t>
+            </a:r>
           </a:p>
           <a:p>
             <a:pPr marL="457200" lvl="1" indent="0">
@@ -5932,6 +6012,13 @@
   <p:clrMapOvr>
     <a:masterClrMapping/>
   </p:clrMapOvr>
+  <p:timing>
+    <p:tnLst>
+      <p:par>
+        <p:cTn id="1" dur="indefinite" restart="never" nodeType="tmRoot"/>
+      </p:par>
+    </p:tnLst>
+  </p:timing>
 </p:sld>
 </file>
 
@@ -6216,6 +6303,13 @@
   <p:clrMapOvr>
     <a:masterClrMapping/>
   </p:clrMapOvr>
+  <p:timing>
+    <p:tnLst>
+      <p:par>
+        <p:cTn id="1" dur="indefinite" restart="never" nodeType="tmRoot"/>
+      </p:par>
+    </p:tnLst>
+  </p:timing>
 </p:sld>
 </file>
 
@@ -6432,6 +6526,13 @@
   <p:clrMapOvr>
     <a:masterClrMapping/>
   </p:clrMapOvr>
+  <p:timing>
+    <p:tnLst>
+      <p:par>
+        <p:cTn id="1" dur="indefinite" restart="never" nodeType="tmRoot"/>
+      </p:par>
+    </p:tnLst>
+  </p:timing>
 </p:sld>
 </file>
 
@@ -6698,6 +6799,13 @@
   <p:clrMapOvr>
     <a:masterClrMapping/>
   </p:clrMapOvr>
+  <p:timing>
+    <p:tnLst>
+      <p:par>
+        <p:cTn id="1" dur="indefinite" restart="never" nodeType="tmRoot"/>
+      </p:par>
+    </p:tnLst>
+  </p:timing>
 </p:sld>
 </file>
 
@@ -6886,6 +6994,13 @@
   <p:clrMapOvr>
     <a:masterClrMapping/>
   </p:clrMapOvr>
+  <p:timing>
+    <p:tnLst>
+      <p:par>
+        <p:cTn id="1" dur="indefinite" restart="never" nodeType="tmRoot"/>
+      </p:par>
+    </p:tnLst>
+  </p:timing>
 </p:sld>
 </file>
 
@@ -7417,6 +7532,13 @@
   <p:clrMapOvr>
     <a:masterClrMapping/>
   </p:clrMapOvr>
+  <p:timing>
+    <p:tnLst>
+      <p:par>
+        <p:cTn id="1" dur="indefinite" restart="never" nodeType="tmRoot"/>
+      </p:par>
+    </p:tnLst>
+  </p:timing>
 </p:sld>
 </file>
 
@@ -7831,6 +7953,13 @@
   <p:clrMapOvr>
     <a:masterClrMapping/>
   </p:clrMapOvr>
+  <p:timing>
+    <p:tnLst>
+      <p:par>
+        <p:cTn id="1" dur="indefinite" restart="never" nodeType="tmRoot"/>
+      </p:par>
+    </p:tnLst>
+  </p:timing>
 </p:sld>
 </file>
 
@@ -8346,6 +8475,16 @@
               </a:rPr>
               <a:t>grow_rectangle</a:t>
             </a:r>
+            <a:endParaRPr lang="en-US" sz="1700" dirty="0" smtClean="0">
+              <a:latin typeface="Times New Roman" charset="0"/>
+              <a:ea typeface="Times New Roman" charset="0"/>
+              <a:cs typeface="Times New Roman" charset="0"/>
+            </a:endParaRPr>
+          </a:p>
+          <a:p>
+            <a:pPr marL="914400" lvl="2" indent="0">
+              <a:buNone/>
+            </a:pPr>
             <a:r>
               <a:rPr lang="en-US" sz="1700" dirty="0" smtClean="0">
                 <a:latin typeface="Times New Roman" charset="0"/>
@@ -8501,6 +8640,13 @@
   <p:clrMapOvr>
     <a:masterClrMapping/>
   </p:clrMapOvr>
+  <p:timing>
+    <p:tnLst>
+      <p:par>
+        <p:cTn id="1" dur="indefinite" restart="never" nodeType="tmRoot"/>
+      </p:par>
+    </p:tnLst>
+  </p:timing>
 </p:sld>
 </file>
 
@@ -8826,6 +8972,13 @@
   <p:clrMapOvr>
     <a:masterClrMapping/>
   </p:clrMapOvr>
+  <p:timing>
+    <p:tnLst>
+      <p:par>
+        <p:cTn id="1" dur="indefinite" restart="never" nodeType="tmRoot"/>
+      </p:par>
+    </p:tnLst>
+  </p:timing>
 </p:sld>
 </file>
 
@@ -9110,6 +9263,13 @@
   <p:clrMapOvr>
     <a:masterClrMapping/>
   </p:clrMapOvr>
+  <p:timing>
+    <p:tnLst>
+      <p:par>
+        <p:cTn id="1" dur="indefinite" restart="never" nodeType="tmRoot"/>
+      </p:par>
+    </p:tnLst>
+  </p:timing>
 </p:sld>
 </file>
 
@@ -9259,6 +9419,13 @@
   <p:clrMapOvr>
     <a:masterClrMapping/>
   </p:clrMapOvr>
+  <p:timing>
+    <p:tnLst>
+      <p:par>
+        <p:cTn id="1" dur="indefinite" restart="never" nodeType="tmRoot"/>
+      </p:par>
+    </p:tnLst>
+  </p:timing>
 </p:sld>
 </file>
 
@@ -9502,6 +9669,13 @@
   <p:clrMapOvr>
     <a:masterClrMapping/>
   </p:clrMapOvr>
+  <p:timing>
+    <p:tnLst>
+      <p:par>
+        <p:cTn id="1" dur="indefinite" restart="never" nodeType="tmRoot"/>
+      </p:par>
+    </p:tnLst>
+  </p:timing>
 </p:sld>
 </file>
 
@@ -9715,6 +9889,13 @@
   <p:clrMapOvr>
     <a:masterClrMapping/>
   </p:clrMapOvr>
+  <p:timing>
+    <p:tnLst>
+      <p:par>
+        <p:cTn id="1" dur="indefinite" restart="never" nodeType="tmRoot"/>
+      </p:par>
+    </p:tnLst>
+  </p:timing>
 </p:sld>
 </file>
 
@@ -9791,6 +9972,13 @@
   <p:clrMapOvr>
     <a:masterClrMapping/>
   </p:clrMapOvr>
+  <p:timing>
+    <p:tnLst>
+      <p:par>
+        <p:cTn id="1" dur="indefinite" restart="never" nodeType="tmRoot"/>
+      </p:par>
+    </p:tnLst>
+  </p:timing>
 </p:sld>
 </file>
 
@@ -10047,6 +10235,13 @@
   <p:clrMapOvr>
     <a:masterClrMapping/>
   </p:clrMapOvr>
+  <p:timing>
+    <p:tnLst>
+      <p:par>
+        <p:cTn id="1" dur="indefinite" restart="never" nodeType="tmRoot"/>
+      </p:par>
+    </p:tnLst>
+  </p:timing>
 </p:sld>
 </file>
 
@@ -10130,6 +10325,13 @@
   <p:clrMapOvr>
     <a:masterClrMapping/>
   </p:clrMapOvr>
+  <p:timing>
+    <p:tnLst>
+      <p:par>
+        <p:cTn id="1" dur="indefinite" restart="never" nodeType="tmRoot"/>
+      </p:par>
+    </p:tnLst>
+  </p:timing>
 </p:sld>
 </file>
 
@@ -10213,6 +10415,13 @@
   <p:clrMapOvr>
     <a:masterClrMapping/>
   </p:clrMapOvr>
+  <p:timing>
+    <p:tnLst>
+      <p:par>
+        <p:cTn id="1" dur="indefinite" restart="never" nodeType="tmRoot"/>
+      </p:par>
+    </p:tnLst>
+  </p:timing>
 </p:sld>
 </file>
 
@@ -10506,6 +10715,13 @@
   <p:clrMapOvr>
     <a:masterClrMapping/>
   </p:clrMapOvr>
+  <p:timing>
+    <p:tnLst>
+      <p:par>
+        <p:cTn id="1" dur="indefinite" restart="never" nodeType="tmRoot"/>
+      </p:par>
+    </p:tnLst>
+  </p:timing>
 </p:sld>
 </file>
 
@@ -10574,6 +10790,13 @@
   <p:clrMapOvr>
     <a:masterClrMapping/>
   </p:clrMapOvr>
+  <p:timing>
+    <p:tnLst>
+      <p:par>
+        <p:cTn id="1" dur="indefinite" restart="never" nodeType="tmRoot"/>
+      </p:par>
+    </p:tnLst>
+  </p:timing>
 </p:sld>
 </file>
 

</xml_diff>